<commit_message>
Added drone application Surveillance and security
</commit_message>
<xml_diff>
--- a/Documentation/PPT/Drone Parts and Budget.pptx
+++ b/Documentation/PPT/Drone Parts and Budget.pptx
@@ -5,16 +5,17 @@
     <p:sldMasterId id="2147483660" r:id="rId1"/>
   </p:sldMasterIdLst>
   <p:notesMasterIdLst>
-    <p:notesMasterId r:id="rId9"/>
+    <p:notesMasterId r:id="rId10"/>
   </p:notesMasterIdLst>
   <p:sldIdLst>
     <p:sldId id="256" r:id="rId2"/>
     <p:sldId id="267" r:id="rId3"/>
-    <p:sldId id="257" r:id="rId4"/>
-    <p:sldId id="262" r:id="rId5"/>
-    <p:sldId id="258" r:id="rId6"/>
-    <p:sldId id="259" r:id="rId7"/>
-    <p:sldId id="266" r:id="rId8"/>
+    <p:sldId id="268" r:id="rId4"/>
+    <p:sldId id="257" r:id="rId5"/>
+    <p:sldId id="262" r:id="rId6"/>
+    <p:sldId id="258" r:id="rId7"/>
+    <p:sldId id="259" r:id="rId8"/>
+    <p:sldId id="266" r:id="rId9"/>
   </p:sldIdLst>
   <p:sldSz cx="12192000" cy="6858000"/>
   <p:notesSz cx="6858000" cy="9144000"/>
@@ -4001,6 +4002,122 @@
           <p:cNvPr id="2" name="Title 1">
             <a:extLst>
               <a:ext uri="{FF2B5EF4-FFF2-40B4-BE49-F238E27FC236}">
+                <a16:creationId xmlns:a16="http://schemas.microsoft.com/office/drawing/2014/main" id="{EC6BE6A6-C810-0098-6CA3-5EBB841DED24}"/>
+              </a:ext>
+            </a:extLst>
+          </p:cNvPr>
+          <p:cNvSpPr>
+            <a:spLocks noGrp="1"/>
+          </p:cNvSpPr>
+          <p:nvPr>
+            <p:ph type="title"/>
+          </p:nvPr>
+        </p:nvSpPr>
+        <p:spPr/>
+        <p:txBody>
+          <a:bodyPr/>
+          <a:lstStyle/>
+          <a:p>
+            <a:r>
+              <a:rPr lang="en-IN" dirty="0"/>
+              <a:t>Drone Applications</a:t>
+            </a:r>
+          </a:p>
+        </p:txBody>
+      </p:sp>
+      <p:sp>
+        <p:nvSpPr>
+          <p:cNvPr id="3" name="Content Placeholder 2">
+            <a:extLst>
+              <a:ext uri="{FF2B5EF4-FFF2-40B4-BE49-F238E27FC236}">
+                <a16:creationId xmlns:a16="http://schemas.microsoft.com/office/drawing/2014/main" id="{C6C6AF71-FBEC-93B4-83A4-21EFEF1020FF}"/>
+              </a:ext>
+            </a:extLst>
+          </p:cNvPr>
+          <p:cNvSpPr>
+            <a:spLocks noGrp="1"/>
+          </p:cNvSpPr>
+          <p:nvPr>
+            <p:ph idx="1"/>
+          </p:nvPr>
+        </p:nvSpPr>
+        <p:spPr>
+          <a:xfrm>
+            <a:off x="2231136" y="2638044"/>
+            <a:ext cx="7729728" cy="3008612"/>
+          </a:xfrm>
+        </p:spPr>
+        <p:txBody>
+          <a:bodyPr>
+            <a:normAutofit/>
+          </a:bodyPr>
+          <a:lstStyle/>
+          <a:p>
+            <a:r>
+              <a:rPr lang="en-IN" dirty="0"/>
+              <a:t>Crop Monitoring – Agriculture</a:t>
+            </a:r>
+          </a:p>
+          <a:p>
+            <a:r>
+              <a:rPr lang="en-IN" dirty="0"/>
+              <a:t>Traffic Breach – Surveillance</a:t>
+            </a:r>
+          </a:p>
+          <a:p>
+            <a:r>
+              <a:rPr lang="en-IN" dirty="0"/>
+              <a:t>Medical Transport System – Healthcare</a:t>
+            </a:r>
+          </a:p>
+          <a:p>
+            <a:r>
+              <a:rPr lang="en-IN" dirty="0"/>
+              <a:t>Disaster Management – Surveillance </a:t>
+            </a:r>
+            <a:r>
+              <a:rPr lang="en-IN"/>
+              <a:t>and Security</a:t>
+            </a:r>
+            <a:endParaRPr lang="en-IN" dirty="0"/>
+          </a:p>
+        </p:txBody>
+      </p:sp>
+    </p:spTree>
+    <p:extLst>
+      <p:ext uri="{BB962C8B-B14F-4D97-AF65-F5344CB8AC3E}">
+        <p14:creationId xmlns:p14="http://schemas.microsoft.com/office/powerpoint/2010/main" val="3224258149"/>
+      </p:ext>
+    </p:extLst>
+  </p:cSld>
+  <p:clrMapOvr>
+    <a:masterClrMapping/>
+  </p:clrMapOvr>
+</p:sld>
+</file>
+
+<file path=ppt/slides/slide4.xml><?xml version="1.0" encoding="utf-8"?>
+<p:sld xmlns:a="http://schemas.openxmlformats.org/drawingml/2006/main" xmlns:r="http://schemas.openxmlformats.org/officeDocument/2006/relationships" xmlns:p="http://schemas.openxmlformats.org/presentationml/2006/main">
+  <p:cSld>
+    <p:spTree>
+      <p:nvGrpSpPr>
+        <p:cNvPr id="1" name=""/>
+        <p:cNvGrpSpPr/>
+        <p:nvPr/>
+      </p:nvGrpSpPr>
+      <p:grpSpPr>
+        <a:xfrm>
+          <a:off x="0" y="0"/>
+          <a:ext cx="0" cy="0"/>
+          <a:chOff x="0" y="0"/>
+          <a:chExt cx="0" cy="0"/>
+        </a:xfrm>
+      </p:grpSpPr>
+      <p:sp>
+        <p:nvSpPr>
+          <p:cNvPr id="2" name="Title 1">
+            <a:extLst>
+              <a:ext uri="{FF2B5EF4-FFF2-40B4-BE49-F238E27FC236}">
                 <a16:creationId xmlns:a16="http://schemas.microsoft.com/office/drawing/2014/main" id="{D4A01BBA-3E81-A382-AFD6-1990C3E1124C}"/>
               </a:ext>
             </a:extLst>
@@ -4067,7 +4184,7 @@
 </p:sld>
 </file>
 
-<file path=ppt/slides/slide4.xml><?xml version="1.0" encoding="utf-8"?>
+<file path=ppt/slides/slide5.xml><?xml version="1.0" encoding="utf-8"?>
 <p:sld xmlns:a="http://schemas.openxmlformats.org/drawingml/2006/main" xmlns:r="http://schemas.openxmlformats.org/officeDocument/2006/relationships" xmlns:p="http://schemas.openxmlformats.org/presentationml/2006/main">
   <p:cSld>
     <p:spTree>
@@ -4300,7 +4417,7 @@
 </p:sld>
 </file>
 
-<file path=ppt/slides/slide5.xml><?xml version="1.0" encoding="utf-8"?>
+<file path=ppt/slides/slide6.xml><?xml version="1.0" encoding="utf-8"?>
 <p:sld xmlns:a="http://schemas.openxmlformats.org/drawingml/2006/main" xmlns:r="http://schemas.openxmlformats.org/officeDocument/2006/relationships" xmlns:p="http://schemas.openxmlformats.org/presentationml/2006/main">
   <p:cSld>
     <p:spTree>
@@ -4414,7 +4531,7 @@
 </p:sld>
 </file>
 
-<file path=ppt/slides/slide6.xml><?xml version="1.0" encoding="utf-8"?>
+<file path=ppt/slides/slide7.xml><?xml version="1.0" encoding="utf-8"?>
 <p:sld xmlns:a="http://schemas.openxmlformats.org/drawingml/2006/main" xmlns:r="http://schemas.openxmlformats.org/officeDocument/2006/relationships" xmlns:p="http://schemas.openxmlformats.org/presentationml/2006/main">
   <p:cSld>
     <p:spTree>
@@ -4696,7 +4813,7 @@
 </p:sld>
 </file>
 
-<file path=ppt/slides/slide7.xml><?xml version="1.0" encoding="utf-8"?>
+<file path=ppt/slides/slide8.xml><?xml version="1.0" encoding="utf-8"?>
 <p:sld xmlns:a="http://schemas.openxmlformats.org/drawingml/2006/main" xmlns:r="http://schemas.openxmlformats.org/officeDocument/2006/relationships" xmlns:p="http://schemas.openxmlformats.org/presentationml/2006/main">
   <p:cSld>
     <p:spTree>

</xml_diff>